<commit_message>
chinu dark picture as ref and edited dark picture taken, it worked
</commit_message>
<xml_diff>
--- a/image_processing/imagediting.pptx
+++ b/image_processing/imagediting.pptx
@@ -6,6 +6,7 @@
   </p:sldMasterIdLst>
   <p:sldIdLst>
     <p:sldId id="256" r:id="rId2"/>
+    <p:sldId id="257" r:id="rId3"/>
   </p:sldIdLst>
   <p:sldSz cx="12192000" cy="6858000"/>
   <p:notesSz cx="6858000" cy="9144000"/>
@@ -3405,6 +3406,132 @@
 </p:sld>
 </file>
 
+<file path=ppt/slides/slide2.xml><?xml version="1.0" encoding="utf-8"?>
+<p:sld xmlns:a="http://schemas.openxmlformats.org/drawingml/2006/main" xmlns:r="http://schemas.openxmlformats.org/officeDocument/2006/relationships" xmlns:p="http://schemas.openxmlformats.org/presentationml/2006/main">
+  <p:cSld>
+    <p:spTree>
+      <p:nvGrpSpPr>
+        <p:cNvPr id="1" name=""/>
+        <p:cNvGrpSpPr/>
+        <p:nvPr/>
+      </p:nvGrpSpPr>
+      <p:grpSpPr>
+        <a:xfrm>
+          <a:off x="0" y="0"/>
+          <a:ext cx="0" cy="0"/>
+          <a:chOff x="0" y="0"/>
+          <a:chExt cx="0" cy="0"/>
+        </a:xfrm>
+      </p:grpSpPr>
+      <p:pic>
+        <p:nvPicPr>
+          <p:cNvPr id="3" name="Picture 2">
+            <a:extLst>
+              <a:ext uri="{FF2B5EF4-FFF2-40B4-BE49-F238E27FC236}">
+                <a16:creationId xmlns:a16="http://schemas.microsoft.com/office/drawing/2014/main" id="{83872575-4D93-3E39-9DCD-8670BD6421B3}"/>
+              </a:ext>
+            </a:extLst>
+          </p:cNvPr>
+          <p:cNvPicPr>
+            <a:picLocks noChangeAspect="1"/>
+          </p:cNvPicPr>
+          <p:nvPr/>
+        </p:nvPicPr>
+        <p:blipFill>
+          <a:blip r:embed="rId2">
+            <a:extLst>
+              <a:ext uri="{28A0092B-C50C-407E-A947-70E740481C1C}">
+                <a14:useLocalDpi xmlns:a14="http://schemas.microsoft.com/office/drawing/2010/main" val="0"/>
+              </a:ext>
+            </a:extLst>
+          </a:blip>
+          <a:stretch>
+            <a:fillRect/>
+          </a:stretch>
+        </p:blipFill>
+        <p:spPr>
+          <a:xfrm>
+            <a:off x="0" y="1814512"/>
+            <a:ext cx="12192000" cy="3228975"/>
+          </a:xfrm>
+          <a:prstGeom prst="rect">
+            <a:avLst/>
+          </a:prstGeom>
+        </p:spPr>
+      </p:pic>
+      <p:pic>
+        <p:nvPicPr>
+          <p:cNvPr id="5" name="Picture 4">
+            <a:extLst>
+              <a:ext uri="{FF2B5EF4-FFF2-40B4-BE49-F238E27FC236}">
+                <a16:creationId xmlns:a16="http://schemas.microsoft.com/office/drawing/2014/main" id="{B83DE37B-B54E-8CA3-D34C-399033406D01}"/>
+              </a:ext>
+            </a:extLst>
+          </p:cNvPr>
+          <p:cNvPicPr>
+            <a:picLocks noChangeAspect="1"/>
+          </p:cNvPicPr>
+          <p:nvPr/>
+        </p:nvPicPr>
+        <p:blipFill>
+          <a:blip r:embed="rId3"/>
+          <a:stretch>
+            <a:fillRect/>
+          </a:stretch>
+        </p:blipFill>
+        <p:spPr>
+          <a:xfrm>
+            <a:off x="4836964" y="4350989"/>
+            <a:ext cx="498286" cy="342257"/>
+          </a:xfrm>
+          <a:prstGeom prst="rect">
+            <a:avLst/>
+          </a:prstGeom>
+        </p:spPr>
+      </p:pic>
+      <p:pic>
+        <p:nvPicPr>
+          <p:cNvPr id="8" name="Picture 7">
+            <a:extLst>
+              <a:ext uri="{FF2B5EF4-FFF2-40B4-BE49-F238E27FC236}">
+                <a16:creationId xmlns:a16="http://schemas.microsoft.com/office/drawing/2014/main" id="{8FDEA545-C3AF-DC1F-F678-46A70462F541}"/>
+              </a:ext>
+            </a:extLst>
+          </p:cNvPr>
+          <p:cNvPicPr>
+            <a:picLocks noChangeAspect="1"/>
+          </p:cNvPicPr>
+          <p:nvPr/>
+        </p:nvPicPr>
+        <p:blipFill>
+          <a:blip r:embed="rId4"/>
+          <a:stretch>
+            <a:fillRect/>
+          </a:stretch>
+        </p:blipFill>
+        <p:spPr>
+          <a:xfrm>
+            <a:off x="7776057" y="2785088"/>
+            <a:ext cx="472506" cy="448150"/>
+          </a:xfrm>
+          <a:prstGeom prst="rect">
+            <a:avLst/>
+          </a:prstGeom>
+        </p:spPr>
+      </p:pic>
+    </p:spTree>
+    <p:extLst>
+      <p:ext uri="{BB962C8B-B14F-4D97-AF65-F5344CB8AC3E}">
+        <p14:creationId xmlns:p14="http://schemas.microsoft.com/office/powerpoint/2010/main" val="2881051292"/>
+      </p:ext>
+    </p:extLst>
+  </p:cSld>
+  <p:clrMapOvr>
+    <a:masterClrMapping/>
+  </p:clrMapOvr>
+</p:sld>
+</file>
+
 <file path=ppt/theme/theme1.xml><?xml version="1.0" encoding="utf-8"?>
 <a:theme xmlns:a="http://schemas.openxmlformats.org/drawingml/2006/main" name="Office Theme">
   <a:themeElements>

</xml_diff>